<commit_message>
Added link to the git repository
</commit_message>
<xml_diff>
--- a/toth_hlavacek_fei_concurrency.pptx
+++ b/toth_hlavacek_fei_concurrency.pptx
@@ -242,7 +242,7 @@
             <a:fld id="{BD8FA3CA-5725-4BA7-A851-72A62AC5A8EE}" type="datetimeFigureOut">
               <a:rPr lang="en-CA" smtClean="0"/>
               <a:pPr/>
-              <a:t>24/03/2015</a:t>
+              <a:t>25/03/2015</a:t>
             </a:fld>
             <a:endParaRPr lang="en-CA"/>
           </a:p>
@@ -409,7 +409,7 @@
             <a:fld id="{C3B58700-9FA2-48CE-AC88-D71D45EB490A}" type="datetimeFigureOut">
               <a:rPr lang="en-US" smtClean="0"/>
               <a:pPr/>
-              <a:t>3/24/2015</a:t>
+              <a:t>3/25/2015</a:t>
             </a:fld>
             <a:endParaRPr lang="en-US"/>
           </a:p>
@@ -19865,11 +19865,7 @@
             </a:r>
             <a:r>
               <a:rPr lang="en-CA" sz="2200" dirty="0" smtClean="0"/>
-              <a:t> </a:t>
-            </a:r>
-            <a:r>
-              <a:rPr lang="en-CA" sz="2200" dirty="0" smtClean="0"/>
-              <a:t>presenter</a:t>
+              <a:t> presenter</a:t>
             </a:r>
           </a:p>
           <a:p>
@@ -19878,7 +19874,6 @@
               <a:rPr lang="en-CA" sz="2200" dirty="0" smtClean="0"/>
               <a:t>vladimir.hlavacek@accenture.com</a:t>
             </a:r>
-            <a:endParaRPr lang="en-CA" sz="2200" dirty="0" smtClean="0"/>
           </a:p>
           <a:p>
             <a:pPr lvl="1"/>
@@ -29132,7 +29127,14 @@
             <a:endParaRPr lang="en-CA" sz="2000" dirty="0" smtClean="0"/>
           </a:p>
           <a:p>
-            <a:endParaRPr lang="en-CA" sz="2200" dirty="0"/>
+            <a:pPr marL="0" indent="0" algn="ctr">
+              <a:buNone/>
+            </a:pPr>
+            <a:r>
+              <a:rPr lang="en-CA" sz="2200" b="1" dirty="0"/>
+              <a:t>https://github.com/hlavacek/threadlecture</a:t>
+            </a:r>
+            <a:endParaRPr lang="en-CA" sz="2200" b="1" dirty="0"/>
           </a:p>
           <a:p>
             <a:pPr marL="225425" lvl="1" indent="0">
@@ -34750,62 +34752,6 @@
 </file>
 
 <file path=customXml/item1.xml><?xml version="1.0" encoding="utf-8"?>
-<?mso-contentType ?>
-<FormTemplates xmlns="http://schemas.microsoft.com/sharepoint/v3/contenttype/forms">
-  <Display>ListForm</Display>
-  <Edit>ListForm</Edit>
-  <New>ListForm</New>
-</FormTemplates>
-</file>
-
-<file path=customXml/item2.xml><?xml version="1.0" encoding="utf-8"?>
-<p:properties xmlns:p="http://schemas.microsoft.com/office/2006/metadata/properties" xmlns:xsi="http://www.w3.org/2001/XMLSchema-instance">
-  <documentManagement>
-    <ArchiveDate xmlns="http://schemas.microsoft.com/sharepoint/v3">2016-02-26T14:10:11+00:00</ArchiveDate>
-    <EngagementLink xmlns="http://schemas.microsoft.com/sharepoint/v3" xsi:nil="true"/>
-    <PertinentToCountry xmlns="http://schemas.microsoft.com/sharepoint/v3" xsi:nil="true"/>
-    <Client xmlns="http://schemas.microsoft.com/sharepoint/v3" xsi:nil="true"/>
-    <PertinentToDomainSpecialty xmlns="http://schemas.microsoft.com/sharepoint/v3" xsi:nil="true"/>
-    <flagVVID xmlns="http://schemas.microsoft.com/sharepoint/v3" xsi:nil="true"/>
-    <RelatedContent xmlns="http://schemas.microsoft.com/sharepoint/v3"> </RelatedContent>
-    <Abstract xmlns="http://schemas.microsoft.com/sharepoint/v3">Java Brownbag session</Abstract>
-    <ContentCurrentDate xmlns="http://schemas.microsoft.com/sharepoint/v3">2014-02-26T14:10:11+00:00</ContentCurrentDate>
-    <DateCreated xmlns="http://schemas.microsoft.com/sharepoint/v3">2014-02-26T14:10:11+00:00</DateCreated>
-    <Geography xmlns="http://schemas.microsoft.com/sharepoint/v3" xsi:nil="true"/>
-    <OfficialAsset xmlns="http://schemas.microsoft.com/sharepoint/v3">No</OfficialAsset>
-    <ArchiveStatus xmlns="http://schemas.microsoft.com/sharepoint/v3">Active</ArchiveStatus>
-    <IndustryKeywords xmlns="http://schemas.microsoft.com/sharepoint/v3">;#0;~None</IndustryKeywords>
-    <VendorProductKeywords xmlns="http://schemas.microsoft.com/sharepoint/v3">;#0;~None</VendorProductKeywords>
-    <RevisionTime xmlns="http://schemas.microsoft.com/sharepoint/v3">4/11/2014 4:15:00 AM&lt;br&gt;2/26/2014 8:10:11 AM</RevisionTime>
-    <Contacts xmlns="http://schemas.microsoft.com/sharepoint/v3">DIR\m.pazitny</Contacts>
-    <ItemType xmlns="http://schemas.microsoft.com/sharepoint/v3">;#13989;~Accenture Internal Material</ItemType>
-    <Offerings xmlns="http://schemas.microsoft.com/sharepoint/v3" xsi:nil="true"/>
-    <ApprovedForUseBy xmlns="http://schemas.microsoft.com/sharepoint/v3" xsi:nil="true"/>
-    <SubmittedBy xmlns="http://schemas.microsoft.com/sharepoint/v3">DIR\daniel.juricek</SubmittedBy>
-    <HasAttachment xmlns="http://schemas.microsoft.com/sharepoint/v3">No</HasAttachment>
-    <SourceType xmlns="http://schemas.microsoft.com/sharepoint/v3">ContributionForm</SourceType>
-    <ArchivalDate xmlns="http://schemas.microsoft.com/sharepoint/v3" xsi:nil="true"/>
-    <DeliveryCenter xmlns="http://schemas.microsoft.com/sharepoint/v3" xsi:nil="true"/>
-    <ContribKeywords xmlns="http://schemas.microsoft.com/sharepoint/v3" xsi:nil="true"/>
-    <StorageType xmlns="http://schemas.microsoft.com/sharepoint/v3">File</StorageType>
-    <RevisionBy xmlns="http://schemas.microsoft.com/sharepoint/v3">kx.massupdate&lt;br&gt;DIR\daniel.juricek</RevisionBy>
-    <VisibleToAsset xmlns="http://schemas.microsoft.com/sharepoint/v3" xsi:nil="true"/>
-    <BusinessFunctionKeywords xmlns="http://schemas.microsoft.com/sharepoint/v3">;#0;~None</BusinessFunctionKeywords>
-    <ConditionsforUse xmlns="http://schemas.microsoft.com/sharepoint/v3">Accenture Internal Use Only</ConditionsforUse>
-    <DetailsPageURL2 xmlns="http://schemas.microsoft.com/sharepoint/v3">https://kx.accenture.com/Repositories/DownloadForm.aspx?path=C27/90/47/spring-batch.pptx</DetailsPageURL2>
-    <FederalData xmlns="http://schemas.microsoft.com/sharepoint/v3">No</FederalData>
-    <KXGeography xmlns="http://schemas.microsoft.com/sharepoint/v3" xsi:nil="true"/>
-    <ConditionsforUseComments xmlns="http://schemas.microsoft.com/sharepoint/v3" xsi:nil="true"/>
-    <TechnologyKeywords xmlns="http://schemas.microsoft.com/sharepoint/v3">;#0;~None</TechnologyKeywords>
-    <PertinentToOrgUnit xmlns="http://schemas.microsoft.com/sharepoint/v3" xsi:nil="true"/>
-    <DetailsPageURL xmlns="http://schemas.microsoft.com/sharepoint/v3">https://kx.accenture.com/Repositories/ContributionForm.aspx?path=C27/90/47&amp;mode=Read</DetailsPageURL>
-    <ContribLanguage xmlns="http://schemas.microsoft.com/sharepoint/v3">;#4628;~English</ContribLanguage>
-    <PertinentToServiceLine xmlns="http://schemas.microsoft.com/sharepoint/v3" xsi:nil="true"/>
-  </documentManagement>
-</p:properties>
-</file>
-
-<file path=customXml/item3.xml><?xml version="1.0" encoding="utf-8"?>
 <ct:contentTypeSchema xmlns:ct="http://schemas.microsoft.com/office/2006/metadata/contentType" xmlns:ma="http://schemas.microsoft.com/office/2006/metadata/properties/metaAttributes" ct:_="" ma:_="" ma:contentTypeName="General Contribution" ma:contentTypeID="0x012000FD200C85A7BB46D2B974A85017C5AC2B0100E26D774630E1294FAA6E2427D65F6817" ma:contentTypeVersion="0" ma:contentTypeDescription="General Contribution" ma:contentTypeScope="" ma:versionID="8de566580f368e48fe41b3d71f72e821">
   <xsd:schema xmlns:xsd="http://www.w3.org/2001/XMLSchema" xmlns:p="http://schemas.microsoft.com/office/2006/metadata/properties" xmlns:ns1="http://schemas.microsoft.com/sharepoint/v3" targetNamespace="http://schemas.microsoft.com/office/2006/metadata/properties" ma:root="true" ma:fieldsID="0eb7c0a7d902ab720327de28b35dbdc6" ns1:_="">
     <xsd:import namespace="http://schemas.microsoft.com/sharepoint/v3"/>
@@ -35101,10 +35047,75 @@
 </ct:contentTypeSchema>
 </file>
 
+<file path=customXml/item2.xml><?xml version="1.0" encoding="utf-8"?>
+<p:properties xmlns:p="http://schemas.microsoft.com/office/2006/metadata/properties" xmlns:xsi="http://www.w3.org/2001/XMLSchema-instance">
+  <documentManagement>
+    <ArchiveDate xmlns="http://schemas.microsoft.com/sharepoint/v3">2016-02-26T14:10:11+00:00</ArchiveDate>
+    <EngagementLink xmlns="http://schemas.microsoft.com/sharepoint/v3" xsi:nil="true"/>
+    <PertinentToCountry xmlns="http://schemas.microsoft.com/sharepoint/v3" xsi:nil="true"/>
+    <Client xmlns="http://schemas.microsoft.com/sharepoint/v3" xsi:nil="true"/>
+    <PertinentToDomainSpecialty xmlns="http://schemas.microsoft.com/sharepoint/v3" xsi:nil="true"/>
+    <flagVVID xmlns="http://schemas.microsoft.com/sharepoint/v3" xsi:nil="true"/>
+    <RelatedContent xmlns="http://schemas.microsoft.com/sharepoint/v3"> </RelatedContent>
+    <Abstract xmlns="http://schemas.microsoft.com/sharepoint/v3">Java Brownbag session</Abstract>
+    <ContentCurrentDate xmlns="http://schemas.microsoft.com/sharepoint/v3">2014-02-26T14:10:11+00:00</ContentCurrentDate>
+    <DateCreated xmlns="http://schemas.microsoft.com/sharepoint/v3">2014-02-26T14:10:11+00:00</DateCreated>
+    <Geography xmlns="http://schemas.microsoft.com/sharepoint/v3" xsi:nil="true"/>
+    <OfficialAsset xmlns="http://schemas.microsoft.com/sharepoint/v3">No</OfficialAsset>
+    <ArchiveStatus xmlns="http://schemas.microsoft.com/sharepoint/v3">Active</ArchiveStatus>
+    <IndustryKeywords xmlns="http://schemas.microsoft.com/sharepoint/v3">;#0;~None</IndustryKeywords>
+    <VendorProductKeywords xmlns="http://schemas.microsoft.com/sharepoint/v3">;#0;~None</VendorProductKeywords>
+    <RevisionTime xmlns="http://schemas.microsoft.com/sharepoint/v3">4/11/2014 4:15:00 AM&lt;br&gt;2/26/2014 8:10:11 AM</RevisionTime>
+    <Contacts xmlns="http://schemas.microsoft.com/sharepoint/v3">DIR\m.pazitny</Contacts>
+    <ItemType xmlns="http://schemas.microsoft.com/sharepoint/v3">;#13989;~Accenture Internal Material</ItemType>
+    <Offerings xmlns="http://schemas.microsoft.com/sharepoint/v3" xsi:nil="true"/>
+    <ApprovedForUseBy xmlns="http://schemas.microsoft.com/sharepoint/v3" xsi:nil="true"/>
+    <SubmittedBy xmlns="http://schemas.microsoft.com/sharepoint/v3">DIR\daniel.juricek</SubmittedBy>
+    <HasAttachment xmlns="http://schemas.microsoft.com/sharepoint/v3">No</HasAttachment>
+    <SourceType xmlns="http://schemas.microsoft.com/sharepoint/v3">ContributionForm</SourceType>
+    <ArchivalDate xmlns="http://schemas.microsoft.com/sharepoint/v3" xsi:nil="true"/>
+    <DeliveryCenter xmlns="http://schemas.microsoft.com/sharepoint/v3" xsi:nil="true"/>
+    <ContribKeywords xmlns="http://schemas.microsoft.com/sharepoint/v3" xsi:nil="true"/>
+    <StorageType xmlns="http://schemas.microsoft.com/sharepoint/v3">File</StorageType>
+    <RevisionBy xmlns="http://schemas.microsoft.com/sharepoint/v3">kx.massupdate&lt;br&gt;DIR\daniel.juricek</RevisionBy>
+    <VisibleToAsset xmlns="http://schemas.microsoft.com/sharepoint/v3" xsi:nil="true"/>
+    <BusinessFunctionKeywords xmlns="http://schemas.microsoft.com/sharepoint/v3">;#0;~None</BusinessFunctionKeywords>
+    <ConditionsforUse xmlns="http://schemas.microsoft.com/sharepoint/v3">Accenture Internal Use Only</ConditionsforUse>
+    <DetailsPageURL2 xmlns="http://schemas.microsoft.com/sharepoint/v3">https://kx.accenture.com/Repositories/DownloadForm.aspx?path=C27/90/47/spring-batch.pptx</DetailsPageURL2>
+    <FederalData xmlns="http://schemas.microsoft.com/sharepoint/v3">No</FederalData>
+    <KXGeography xmlns="http://schemas.microsoft.com/sharepoint/v3" xsi:nil="true"/>
+    <ConditionsforUseComments xmlns="http://schemas.microsoft.com/sharepoint/v3" xsi:nil="true"/>
+    <TechnologyKeywords xmlns="http://schemas.microsoft.com/sharepoint/v3">;#0;~None</TechnologyKeywords>
+    <PertinentToOrgUnit xmlns="http://schemas.microsoft.com/sharepoint/v3" xsi:nil="true"/>
+    <DetailsPageURL xmlns="http://schemas.microsoft.com/sharepoint/v3">https://kx.accenture.com/Repositories/ContributionForm.aspx?path=C27/90/47&amp;mode=Read</DetailsPageURL>
+    <ContribLanguage xmlns="http://schemas.microsoft.com/sharepoint/v3">;#4628;~English</ContribLanguage>
+    <PertinentToServiceLine xmlns="http://schemas.microsoft.com/sharepoint/v3" xsi:nil="true"/>
+  </documentManagement>
+</p:properties>
+</file>
+
+<file path=customXml/item3.xml><?xml version="1.0" encoding="utf-8"?>
+<?mso-contentType ?>
+<FormTemplates xmlns="http://schemas.microsoft.com/sharepoint/v3/contenttype/forms">
+  <Display>ListForm</Display>
+  <Edit>ListForm</Edit>
+  <New>ListForm</New>
+</FormTemplates>
+</file>
+
 <file path=customXml/itemProps1.xml><?xml version="1.0" encoding="utf-8"?>
-<ds:datastoreItem xmlns:ds="http://schemas.openxmlformats.org/officeDocument/2006/customXml" ds:itemID="{7DB199BD-91F7-45DF-8B83-8AC99D2ADE96}">
+<ds:datastoreItem xmlns:ds="http://schemas.openxmlformats.org/officeDocument/2006/customXml" ds:itemID="{E9DF2230-F59E-4081-BE6D-E79196ABEA77}">
   <ds:schemaRefs>
-    <ds:schemaRef ds:uri="http://schemas.microsoft.com/sharepoint/v3/contenttype/forms"/>
+    <ds:schemaRef ds:uri="http://schemas.microsoft.com/office/2006/metadata/contentType"/>
+    <ds:schemaRef ds:uri="http://schemas.microsoft.com/office/2006/metadata/properties/metaAttributes"/>
+    <ds:schemaRef ds:uri="http://www.w3.org/2001/XMLSchema"/>
+    <ds:schemaRef ds:uri="http://schemas.microsoft.com/office/2006/metadata/properties"/>
+    <ds:schemaRef ds:uri="http://schemas.microsoft.com/sharepoint/v3"/>
+    <ds:schemaRef ds:uri="http://schemas.microsoft.com/office/2006/documentManagement/types"/>
+    <ds:schemaRef ds:uri="http://schemas.openxmlformats.org/package/2006/metadata/core-properties"/>
+    <ds:schemaRef ds:uri="http://purl.org/dc/elements/1.1/"/>
+    <ds:schemaRef ds:uri="http://purl.org/dc/terms/"/>
+    <ds:schemaRef ds:uri="http://schemas.microsoft.com/office/internal/2005/internalDocumentation"/>
   </ds:schemaRefs>
 </ds:datastoreItem>
 </file>
@@ -35125,18 +35136,9 @@
 </file>
 
 <file path=customXml/itemProps3.xml><?xml version="1.0" encoding="utf-8"?>
-<ds:datastoreItem xmlns:ds="http://schemas.openxmlformats.org/officeDocument/2006/customXml" ds:itemID="{E9DF2230-F59E-4081-BE6D-E79196ABEA77}">
+<ds:datastoreItem xmlns:ds="http://schemas.openxmlformats.org/officeDocument/2006/customXml" ds:itemID="{7DB199BD-91F7-45DF-8B83-8AC99D2ADE96}">
   <ds:schemaRefs>
-    <ds:schemaRef ds:uri="http://schemas.microsoft.com/office/2006/metadata/contentType"/>
-    <ds:schemaRef ds:uri="http://schemas.microsoft.com/office/2006/metadata/properties/metaAttributes"/>
-    <ds:schemaRef ds:uri="http://www.w3.org/2001/XMLSchema"/>
-    <ds:schemaRef ds:uri="http://schemas.microsoft.com/office/2006/metadata/properties"/>
-    <ds:schemaRef ds:uri="http://schemas.microsoft.com/sharepoint/v3"/>
-    <ds:schemaRef ds:uri="http://schemas.microsoft.com/office/2006/documentManagement/types"/>
-    <ds:schemaRef ds:uri="http://schemas.openxmlformats.org/package/2006/metadata/core-properties"/>
-    <ds:schemaRef ds:uri="http://purl.org/dc/elements/1.1/"/>
-    <ds:schemaRef ds:uri="http://purl.org/dc/terms/"/>
-    <ds:schemaRef ds:uri="http://schemas.microsoft.com/office/internal/2005/internalDocumentation"/>
+    <ds:schemaRef ds:uri="http://schemas.microsoft.com/sharepoint/v3/contenttype/forms"/>
   </ds:schemaRefs>
 </ds:datastoreItem>
 </file>
</xml_diff>